<commit_message>
Fixed typos in code in comparison slide
</commit_message>
<xml_diff>
--- a/Architecture/arm_introduction/ARM/ARM_intro_lecture.pptx
+++ b/Architecture/arm_introduction/ARM/ARM_intro_lecture.pptx
@@ -219,7 +219,7 @@
           <a:p>
             <a:fld id="{260930CF-E1B1-E844-9903-DBA6F9AF788E}" type="datetimeFigureOut">
               <a:rPr lang="en-US" smtClean="0"/>
-              <a:t>8/13/20</a:t>
+              <a:t>7/14/22</a:t>
             </a:fld>
             <a:endParaRPr lang="en-US"/>
           </a:p>
@@ -10600,7 +10600,7 @@
           <a:p>
             <a:r>
               <a:rPr lang="en-US" dirty="0"/>
-              <a:t>for(int x = 1; x &lt; 10=; x++)</a:t>
+              <a:t>for(int x = 1; x &lt;= 10; x++)</a:t>
             </a:r>
           </a:p>
           <a:p>
@@ -10742,8 +10742,17 @@
               <a:rPr lang="en-US" dirty="0">
                 <a:latin typeface="Courier" pitchFamily="2" charset="0"/>
               </a:rPr>
-              <a:t> $4, skip</a:t>
-            </a:r>
+              <a:t> $4, </a:t>
+            </a:r>
+            <a:r>
+              <a:rPr lang="en-US" dirty="0" err="1">
+                <a:latin typeface="Courier" pitchFamily="2" charset="0"/>
+              </a:rPr>
+              <a:t>sk</a:t>
+            </a:r>
+            <a:endParaRPr lang="en-US" dirty="0">
+              <a:latin typeface="Courier" pitchFamily="2" charset="0"/>
+            </a:endParaRPr>
           </a:p>
           <a:p>
             <a:r>
@@ -10784,8 +10793,17 @@
               <a:rPr lang="en-US" dirty="0">
                 <a:latin typeface="Courier" pitchFamily="2" charset="0"/>
               </a:rPr>
-              <a:t>     j loop</a:t>
-            </a:r>
+              <a:t>     j </a:t>
+            </a:r>
+            <a:r>
+              <a:rPr lang="en-US" dirty="0" err="1">
+                <a:latin typeface="Courier" pitchFamily="2" charset="0"/>
+              </a:rPr>
+              <a:t>lp</a:t>
+            </a:r>
+            <a:endParaRPr lang="en-US" dirty="0">
+              <a:latin typeface="Courier" pitchFamily="2" charset="0"/>
+            </a:endParaRPr>
           </a:p>
           <a:p>
             <a:r>
@@ -10870,7 +10888,7 @@
               <a:rPr lang="en-US" dirty="0">
                 <a:latin typeface="Courier" pitchFamily="2" charset="0"/>
               </a:rPr>
-              <a:t>    BGT exit</a:t>
+              <a:t>    BGT ex</a:t>
             </a:r>
           </a:p>
           <a:p>
@@ -10910,8 +10928,17 @@
               <a:rPr lang="en-US" dirty="0">
                 <a:latin typeface="Courier" pitchFamily="2" charset="0"/>
               </a:rPr>
-              <a:t>    BAL  loop</a:t>
-            </a:r>
+              <a:t>    BAL  </a:t>
+            </a:r>
+            <a:r>
+              <a:rPr lang="en-US" dirty="0" err="1">
+                <a:latin typeface="Courier" pitchFamily="2" charset="0"/>
+              </a:rPr>
+              <a:t>lp</a:t>
+            </a:r>
+            <a:endParaRPr lang="en-US" dirty="0">
+              <a:latin typeface="Courier" pitchFamily="2" charset="0"/>
+            </a:endParaRPr>
           </a:p>
           <a:p>
             <a:r>

</xml_diff>